<commit_message>
Updated presentations to include Paul's name...
</commit_message>
<xml_diff>
--- a/Presentation/THasINKync - 16x9.pptx
+++ b/Presentation/THasINKync - 16x9.pptx
@@ -18000,7 +18000,6 @@
               <a:rPr lang="en-US" dirty="0"/>
               <a:t>Rhetorical Joke</a:t>
             </a:r>
-            <a:endParaRPr lang="en-US" dirty="0"/>
           </a:p>
         </p:txBody>
       </p:sp>
@@ -19859,12 +19858,12 @@
               <a:t>Audience Participation</a:t>
             </a:r>
             <a:r>
-              <a:rPr lang="en-US" dirty="0"/>
+              <a:rPr lang="en-US"/>
               <a:t>:  </a:t>
             </a:r>
             <a:r>
-              <a:rPr lang="en-US" dirty="0" smtClean="0"/>
-              <a:t>Anybody</a:t>
+              <a:rPr lang="en-US"/>
+              <a:t>Paul DeCarlo</a:t>
             </a:r>
             <a:endParaRPr lang="en-US" dirty="0"/>
           </a:p>
@@ -22200,11 +22199,7 @@
           <a:p>
             <a:r>
               <a:rPr lang="en-US" dirty="0" smtClean="0"/>
-              <a:t>Word </a:t>
-            </a:r>
-            <a:r>
-              <a:rPr lang="en-US" dirty="0" smtClean="0"/>
-              <a:t>Joke</a:t>
+              <a:t>Word Joke</a:t>
             </a:r>
             <a:endParaRPr lang="en-US" dirty="0"/>
           </a:p>
@@ -22941,9 +22936,12 @@
 </file>
 
 <file path=customXml/item1.xml><?xml version="1.0" encoding="utf-8"?>
-<p:properties xmlns:p="http://schemas.microsoft.com/office/2006/metadata/properties" xmlns:xsi="http://www.w3.org/2001/XMLSchema-instance" xmlns:pc="http://schemas.microsoft.com/office/infopath/2007/PartnerControls">
-  <documentManagement/>
-</p:properties>
+<?mso-contentType ?>
+<FormTemplates xmlns="http://schemas.microsoft.com/sharepoint/v3/contenttype/forms">
+  <Display>DocumentLibraryForm</Display>
+  <Edit>DocumentLibraryForm</Edit>
+  <New>DocumentLibraryForm</New>
+</FormTemplates>
 </file>
 
 <file path=customXml/item2.xml><?xml version="1.0" encoding="utf-8"?>
@@ -23061,25 +23059,15 @@
 </file>
 
 <file path=customXml/item3.xml><?xml version="1.0" encoding="utf-8"?>
-<?mso-contentType ?>
-<FormTemplates xmlns="http://schemas.microsoft.com/sharepoint/v3/contenttype/forms">
-  <Display>DocumentLibraryForm</Display>
-  <Edit>DocumentLibraryForm</Edit>
-  <New>DocumentLibraryForm</New>
-</FormTemplates>
+<p:properties xmlns:p="http://schemas.microsoft.com/office/2006/metadata/properties" xmlns:xsi="http://www.w3.org/2001/XMLSchema-instance" xmlns:pc="http://schemas.microsoft.com/office/infopath/2007/PartnerControls">
+  <documentManagement/>
+</p:properties>
 </file>
 
 <file path=customXml/itemProps1.xml><?xml version="1.0" encoding="utf-8"?>
-<ds:datastoreItem xmlns:ds="http://schemas.openxmlformats.org/officeDocument/2006/customXml" ds:itemID="{A04551C0-1604-41A0-9B5C-A5F88AD2E0FE}">
+<ds:datastoreItem xmlns:ds="http://schemas.openxmlformats.org/officeDocument/2006/customXml" ds:itemID="{B857AB07-B2ED-439E-860F-4F56FB345D1B}">
   <ds:schemaRefs>
-    <ds:schemaRef ds:uri="http://schemas.microsoft.com/office/infopath/2007/PartnerControls"/>
-    <ds:schemaRef ds:uri="http://purl.org/dc/elements/1.1/"/>
-    <ds:schemaRef ds:uri="http://schemas.microsoft.com/office/2006/metadata/properties"/>
-    <ds:schemaRef ds:uri="http://purl.org/dc/terms/"/>
-    <ds:schemaRef ds:uri="http://schemas.openxmlformats.org/package/2006/metadata/core-properties"/>
-    <ds:schemaRef ds:uri="http://schemas.microsoft.com/office/2006/documentManagement/types"/>
-    <ds:schemaRef ds:uri="http://www.w3.org/XML/1998/namespace"/>
-    <ds:schemaRef ds:uri="http://purl.org/dc/dcmitype/"/>
+    <ds:schemaRef ds:uri="http://schemas.microsoft.com/sharepoint/v3/contenttype/forms"/>
   </ds:schemaRefs>
 </ds:datastoreItem>
 </file>
@@ -23101,9 +23089,16 @@
 </file>
 
 <file path=customXml/itemProps3.xml><?xml version="1.0" encoding="utf-8"?>
-<ds:datastoreItem xmlns:ds="http://schemas.openxmlformats.org/officeDocument/2006/customXml" ds:itemID="{B857AB07-B2ED-439E-860F-4F56FB345D1B}">
+<ds:datastoreItem xmlns:ds="http://schemas.openxmlformats.org/officeDocument/2006/customXml" ds:itemID="{A04551C0-1604-41A0-9B5C-A5F88AD2E0FE}">
   <ds:schemaRefs>
-    <ds:schemaRef ds:uri="http://schemas.microsoft.com/sharepoint/v3/contenttype/forms"/>
+    <ds:schemaRef ds:uri="http://schemas.microsoft.com/office/infopath/2007/PartnerControls"/>
+    <ds:schemaRef ds:uri="http://purl.org/dc/elements/1.1/"/>
+    <ds:schemaRef ds:uri="http://schemas.microsoft.com/office/2006/metadata/properties"/>
+    <ds:schemaRef ds:uri="http://purl.org/dc/terms/"/>
+    <ds:schemaRef ds:uri="http://schemas.openxmlformats.org/package/2006/metadata/core-properties"/>
+    <ds:schemaRef ds:uri="http://schemas.microsoft.com/office/2006/documentManagement/types"/>
+    <ds:schemaRef ds:uri="http://www.w3.org/XML/1998/namespace"/>
+    <ds:schemaRef ds:uri="http://purl.org/dc/dcmitype/"/>
   </ds:schemaRefs>
 </ds:datastoreItem>
 </file>
</xml_diff>

<commit_message>
Finished dynamic task parallelism example.
</commit_message>
<xml_diff>
--- a/Presentation/THasINKync - 16x9.pptx
+++ b/Presentation/THasINKync - 16x9.pptx
@@ -34,13 +34,14 @@
     <p:sldId id="287" r:id="rId31"/>
     <p:sldId id="283" r:id="rId32"/>
     <p:sldId id="284" r:id="rId33"/>
-    <p:sldId id="288" r:id="rId34"/>
-    <p:sldId id="285" r:id="rId35"/>
-    <p:sldId id="286" r:id="rId36"/>
-    <p:sldId id="292" r:id="rId37"/>
-    <p:sldId id="289" r:id="rId38"/>
-    <p:sldId id="276" r:id="rId39"/>
-    <p:sldId id="294" r:id="rId40"/>
+    <p:sldId id="296" r:id="rId34"/>
+    <p:sldId id="288" r:id="rId35"/>
+    <p:sldId id="285" r:id="rId36"/>
+    <p:sldId id="286" r:id="rId37"/>
+    <p:sldId id="292" r:id="rId38"/>
+    <p:sldId id="289" r:id="rId39"/>
+    <p:sldId id="276" r:id="rId40"/>
+    <p:sldId id="294" r:id="rId41"/>
   </p:sldIdLst>
   <p:sldSz cx="9144000" cy="5143500" type="screen16x9"/>
   <p:notesSz cx="6858000" cy="9144000"/>
@@ -141,7 +142,7 @@
   </p:defaultTextStyle>
   <p:extLst>
     <p:ext uri="{EFAFB233-063F-42B5-8137-9DF3F51BA10A}">
-      <p15:sldGuideLst xmlns="" xmlns:p15="http://schemas.microsoft.com/office/powerpoint/2012/main">
+      <p15:sldGuideLst xmlns:p15="http://schemas.microsoft.com/office/powerpoint/2012/main" xmlns="">
         <p15:guide id="1" orient="horz" pos="1620" userDrawn="1">
           <p15:clr>
             <a:srgbClr val="A4A3A4"/>
@@ -8047,7 +8048,7 @@
           <a:p>
             <a:fld id="{2A7CB402-B72D-3346-9EA5-354251120F9E}" type="datetimeFigureOut">
               <a:rPr lang="en-US" smtClean="0"/>
-              <a:t>10/8/2015</a:t>
+              <a:t>10/13/2015</a:t>
             </a:fld>
             <a:endParaRPr lang="en-US"/>
           </a:p>
@@ -8210,7 +8211,7 @@
           <a:p>
             <a:fld id="{2A7CB402-B72D-3346-9EA5-354251120F9E}" type="datetimeFigureOut">
               <a:rPr lang="en-US" smtClean="0"/>
-              <a:t>10/8/2015</a:t>
+              <a:t>10/13/2015</a:t>
             </a:fld>
             <a:endParaRPr lang="en-US"/>
           </a:p>
@@ -8371,7 +8372,7 @@
           <a:p>
             <a:fld id="{2A7CB402-B72D-3346-9EA5-354251120F9E}" type="datetimeFigureOut">
               <a:rPr lang="en-US" smtClean="0"/>
-              <a:t>10/8/2015</a:t>
+              <a:t>10/13/2015</a:t>
             </a:fld>
             <a:endParaRPr lang="en-US"/>
           </a:p>
@@ -8570,7 +8571,7 @@
           <a:p>
             <a:fld id="{2A7CB402-B72D-3346-9EA5-354251120F9E}" type="datetimeFigureOut">
               <a:rPr lang="en-US" smtClean="0"/>
-              <a:t>10/8/2015</a:t>
+              <a:t>10/13/2015</a:t>
             </a:fld>
             <a:endParaRPr lang="en-US"/>
           </a:p>
@@ -8801,7 +8802,7 @@
           <a:p>
             <a:fld id="{2A7CB402-B72D-3346-9EA5-354251120F9E}" type="datetimeFigureOut">
               <a:rPr lang="en-US" smtClean="0"/>
-              <a:t>10/8/2015</a:t>
+              <a:t>10/13/2015</a:t>
             </a:fld>
             <a:endParaRPr lang="en-US"/>
           </a:p>
@@ -9125,7 +9126,7 @@
           <a:p>
             <a:fld id="{2A7CB402-B72D-3346-9EA5-354251120F9E}" type="datetimeFigureOut">
               <a:rPr lang="en-US" smtClean="0"/>
-              <a:t>10/8/2015</a:t>
+              <a:t>10/13/2015</a:t>
             </a:fld>
             <a:endParaRPr lang="en-US"/>
           </a:p>
@@ -9587,7 +9588,7 @@
           <a:p>
             <a:fld id="{2A7CB402-B72D-3346-9EA5-354251120F9E}" type="datetimeFigureOut">
               <a:rPr lang="en-US" smtClean="0"/>
-              <a:t>10/8/2015</a:t>
+              <a:t>10/13/2015</a:t>
             </a:fld>
             <a:endParaRPr lang="en-US"/>
           </a:p>
@@ -9701,7 +9702,7 @@
           <a:p>
             <a:fld id="{2A7CB402-B72D-3346-9EA5-354251120F9E}" type="datetimeFigureOut">
               <a:rPr lang="en-US" smtClean="0"/>
-              <a:t>10/8/2015</a:t>
+              <a:t>10/13/2015</a:t>
             </a:fld>
             <a:endParaRPr lang="en-US"/>
           </a:p>
@@ -9777,7 +9778,7 @@
           <a:p>
             <a:fld id="{2A7CB402-B72D-3346-9EA5-354251120F9E}" type="datetimeFigureOut">
               <a:rPr lang="en-US" smtClean="0"/>
-              <a:t>10/8/2015</a:t>
+              <a:t>10/13/2015</a:t>
             </a:fld>
             <a:endParaRPr lang="en-US"/>
           </a:p>
@@ -10071,7 +10072,7 @@
           <a:p>
             <a:fld id="{2A7CB402-B72D-3346-9EA5-354251120F9E}" type="datetimeFigureOut">
               <a:rPr lang="en-US" smtClean="0"/>
-              <a:t>10/8/2015</a:t>
+              <a:t>10/13/2015</a:t>
             </a:fld>
             <a:endParaRPr lang="en-US"/>
           </a:p>
@@ -10309,7 +10310,7 @@
           <a:p>
             <a:fld id="{2A7CB402-B72D-3346-9EA5-354251120F9E}" type="datetimeFigureOut">
               <a:rPr lang="en-US" smtClean="0"/>
-              <a:t>10/8/2015</a:t>
+              <a:t>10/13/2015</a:t>
             </a:fld>
             <a:endParaRPr lang="en-US"/>
           </a:p>
@@ -10503,7 +10504,7 @@
           <a:p>
             <a:fld id="{2A7CB402-B72D-3346-9EA5-354251120F9E}" type="datetimeFigureOut">
               <a:rPr lang="en-US" smtClean="0"/>
-              <a:t>10/8/2015</a:t>
+              <a:t>10/13/2015</a:t>
             </a:fld>
             <a:endParaRPr lang="en-US"/>
           </a:p>
@@ -11226,11 +11227,11 @@
   <p:clrMapOvr>
     <a:masterClrMapping/>
   </p:clrMapOvr>
-  <mc:AlternateContent xmlns:mc="http://schemas.openxmlformats.org/markup-compatibility/2006">
-    <mc:Choice xmlns:p14="http://schemas.microsoft.com/office/powerpoint/2010/main" Requires="p14">
+  <mc:AlternateContent xmlns:mc="http://schemas.openxmlformats.org/markup-compatibility/2006" xmlns:p14="http://schemas.microsoft.com/office/powerpoint/2010/main">
+    <mc:Choice Requires="p14">
       <p:transition spd="slow" p14:dur="2000"/>
     </mc:Choice>
-    <mc:Fallback>
+    <mc:Fallback xmlns="">
       <p:transition spd="slow"/>
     </mc:Fallback>
   </mc:AlternateContent>
@@ -11343,11 +11344,11 @@
   <p:clrMapOvr>
     <a:masterClrMapping/>
   </p:clrMapOvr>
-  <mc:AlternateContent xmlns:mc="http://schemas.openxmlformats.org/markup-compatibility/2006">
-    <mc:Choice xmlns:p14="http://schemas.microsoft.com/office/powerpoint/2010/main" Requires="p14">
+  <mc:AlternateContent xmlns:mc="http://schemas.openxmlformats.org/markup-compatibility/2006" xmlns:p14="http://schemas.microsoft.com/office/powerpoint/2010/main">
+    <mc:Choice Requires="p14">
       <p:transition spd="slow" p14:dur="2000"/>
     </mc:Choice>
-    <mc:Fallback>
+    <mc:Fallback xmlns="">
       <p:transition spd="slow"/>
     </mc:Fallback>
   </mc:AlternateContent>
@@ -11441,11 +11442,11 @@
   <p:clrMapOvr>
     <a:masterClrMapping/>
   </p:clrMapOvr>
-  <mc:AlternateContent xmlns:mc="http://schemas.openxmlformats.org/markup-compatibility/2006">
-    <mc:Choice xmlns:p14="http://schemas.microsoft.com/office/powerpoint/2010/main" Requires="p14">
+  <mc:AlternateContent xmlns:mc="http://schemas.openxmlformats.org/markup-compatibility/2006" xmlns:p14="http://schemas.microsoft.com/office/powerpoint/2010/main">
+    <mc:Choice Requires="p14">
       <p:transition spd="slow" p14:dur="2000"/>
     </mc:Choice>
-    <mc:Fallback>
+    <mc:Fallback xmlns="">
       <p:transition spd="slow"/>
     </mc:Fallback>
   </mc:AlternateContent>
@@ -11562,11 +11563,11 @@
   <p:clrMapOvr>
     <a:masterClrMapping/>
   </p:clrMapOvr>
-  <mc:AlternateContent xmlns:mc="http://schemas.openxmlformats.org/markup-compatibility/2006">
-    <mc:Choice xmlns:p14="http://schemas.microsoft.com/office/powerpoint/2010/main" Requires="p14">
+  <mc:AlternateContent xmlns:mc="http://schemas.openxmlformats.org/markup-compatibility/2006" xmlns:p14="http://schemas.microsoft.com/office/powerpoint/2010/main">
+    <mc:Choice Requires="p14">
       <p:transition spd="slow" p14:dur="2000"/>
     </mc:Choice>
-    <mc:Fallback>
+    <mc:Fallback xmlns="">
       <p:transition spd="slow"/>
     </mc:Fallback>
   </mc:AlternateContent>
@@ -11658,11 +11659,11 @@
   <p:clrMapOvr>
     <a:masterClrMapping/>
   </p:clrMapOvr>
-  <mc:AlternateContent xmlns:mc="http://schemas.openxmlformats.org/markup-compatibility/2006">
-    <mc:Choice xmlns:p14="http://schemas.microsoft.com/office/powerpoint/2010/main" Requires="p14">
+  <mc:AlternateContent xmlns:mc="http://schemas.openxmlformats.org/markup-compatibility/2006" xmlns:p14="http://schemas.microsoft.com/office/powerpoint/2010/main">
+    <mc:Choice Requires="p14">
       <p:transition spd="slow" p14:dur="2000"/>
     </mc:Choice>
-    <mc:Fallback>
+    <mc:Fallback xmlns="">
       <p:transition spd="slow"/>
     </mc:Fallback>
   </mc:AlternateContent>
@@ -13427,11 +13428,11 @@
   <p:clrMapOvr>
     <a:masterClrMapping/>
   </p:clrMapOvr>
-  <mc:AlternateContent xmlns:mc="http://schemas.openxmlformats.org/markup-compatibility/2006">
-    <mc:Choice xmlns:p14="http://schemas.microsoft.com/office/powerpoint/2010/main" Requires="p14">
+  <mc:AlternateContent xmlns:mc="http://schemas.openxmlformats.org/markup-compatibility/2006" xmlns:p14="http://schemas.microsoft.com/office/powerpoint/2010/main">
+    <mc:Choice Requires="p14">
       <p:transition spd="slow" p14:dur="2000"/>
     </mc:Choice>
-    <mc:Fallback>
+    <mc:Fallback xmlns="">
       <p:transition spd="slow"/>
     </mc:Fallback>
   </mc:AlternateContent>
@@ -13699,11 +13700,11 @@
   <p:clrMapOvr>
     <a:masterClrMapping/>
   </p:clrMapOvr>
-  <mc:AlternateContent xmlns:mc="http://schemas.openxmlformats.org/markup-compatibility/2006">
-    <mc:Choice xmlns:p14="http://schemas.microsoft.com/office/powerpoint/2010/main" Requires="p14">
+  <mc:AlternateContent xmlns:mc="http://schemas.openxmlformats.org/markup-compatibility/2006" xmlns:p14="http://schemas.microsoft.com/office/powerpoint/2010/main">
+    <mc:Choice Requires="p14">
       <p:transition spd="slow" p14:dur="2000"/>
     </mc:Choice>
-    <mc:Fallback>
+    <mc:Fallback xmlns="">
       <p:transition spd="slow"/>
     </mc:Fallback>
   </mc:AlternateContent>
@@ -13801,11 +13802,11 @@
   <p:clrMapOvr>
     <a:masterClrMapping/>
   </p:clrMapOvr>
-  <mc:AlternateContent xmlns:mc="http://schemas.openxmlformats.org/markup-compatibility/2006">
-    <mc:Choice xmlns:p14="http://schemas.microsoft.com/office/powerpoint/2010/main" Requires="p14">
+  <mc:AlternateContent xmlns:mc="http://schemas.openxmlformats.org/markup-compatibility/2006" xmlns:p14="http://schemas.microsoft.com/office/powerpoint/2010/main">
+    <mc:Choice Requires="p14">
       <p:transition spd="slow" p14:dur="2000"/>
     </mc:Choice>
-    <mc:Fallback>
+    <mc:Fallback xmlns="">
       <p:transition spd="slow"/>
     </mc:Fallback>
   </mc:AlternateContent>
@@ -13896,7 +13897,17 @@
           <a:p>
             <a:r>
               <a:rPr lang="en-US" dirty="0" smtClean="0"/>
-              <a:t>Futures (Task Graph)</a:t>
+              <a:t>Futures (Task Graph</a:t>
+            </a:r>
+            <a:r>
+              <a:rPr lang="en-US" dirty="0" smtClean="0"/>
+              <a:t>)</a:t>
+            </a:r>
+          </a:p>
+          <a:p>
+            <a:r>
+              <a:rPr lang="en-US" dirty="0"/>
+              <a:t>Dynamic Task Parallelism</a:t>
             </a:r>
           </a:p>
           <a:p>
@@ -13904,6 +13915,7 @@
               <a:rPr lang="en-US" dirty="0" smtClean="0"/>
               <a:t>Pipelines</a:t>
             </a:r>
+            <a:endParaRPr lang="en-US" dirty="0" smtClean="0"/>
           </a:p>
         </p:txBody>
       </p:sp>
@@ -13917,11 +13929,11 @@
   <p:clrMapOvr>
     <a:masterClrMapping/>
   </p:clrMapOvr>
-  <mc:AlternateContent xmlns:mc="http://schemas.openxmlformats.org/markup-compatibility/2006">
-    <mc:Choice xmlns:p14="http://schemas.microsoft.com/office/powerpoint/2010/main" Requires="p14">
+  <mc:AlternateContent xmlns:mc="http://schemas.openxmlformats.org/markup-compatibility/2006" xmlns:p14="http://schemas.microsoft.com/office/powerpoint/2010/main">
+    <mc:Choice Requires="p14">
       <p:transition spd="slow" p14:dur="2000"/>
     </mc:Choice>
-    <mc:Fallback>
+    <mc:Fallback xmlns="">
       <p:transition spd="slow"/>
     </mc:Fallback>
   </mc:AlternateContent>
@@ -14018,11 +14030,11 @@
   <p:clrMapOvr>
     <a:masterClrMapping/>
   </p:clrMapOvr>
-  <mc:AlternateContent xmlns:mc="http://schemas.openxmlformats.org/markup-compatibility/2006">
-    <mc:Choice xmlns:p14="http://schemas.microsoft.com/office/powerpoint/2010/main" Requires="p14">
+  <mc:AlternateContent xmlns:mc="http://schemas.openxmlformats.org/markup-compatibility/2006" xmlns:p14="http://schemas.microsoft.com/office/powerpoint/2010/main">
+    <mc:Choice Requires="p14">
       <p:transition spd="slow" p14:dur="2000"/>
     </mc:Choice>
-    <mc:Fallback>
+    <mc:Fallback xmlns="">
       <p:transition spd="slow"/>
     </mc:Fallback>
   </mc:AlternateContent>
@@ -14145,11 +14157,11 @@
   <p:clrMapOvr>
     <a:masterClrMapping/>
   </p:clrMapOvr>
-  <mc:AlternateContent xmlns:mc="http://schemas.openxmlformats.org/markup-compatibility/2006">
-    <mc:Choice xmlns:p14="http://schemas.microsoft.com/office/powerpoint/2010/main" Requires="p14">
+  <mc:AlternateContent xmlns:mc="http://schemas.openxmlformats.org/markup-compatibility/2006" xmlns:p14="http://schemas.microsoft.com/office/powerpoint/2010/main">
+    <mc:Choice Requires="p14">
       <p:transition spd="slow" p14:dur="2000"/>
     </mc:Choice>
-    <mc:Fallback>
+    <mc:Fallback xmlns="">
       <p:transition spd="slow"/>
     </mc:Fallback>
   </mc:AlternateContent>
@@ -14352,11 +14364,11 @@
   <p:clrMapOvr>
     <a:masterClrMapping/>
   </p:clrMapOvr>
-  <mc:AlternateContent xmlns:mc="http://schemas.openxmlformats.org/markup-compatibility/2006">
-    <mc:Choice xmlns:p14="http://schemas.microsoft.com/office/powerpoint/2010/main" Requires="p14">
+  <mc:AlternateContent xmlns:mc="http://schemas.openxmlformats.org/markup-compatibility/2006" xmlns:p14="http://schemas.microsoft.com/office/powerpoint/2010/main">
+    <mc:Choice Requires="p14">
       <p:transition spd="slow" p14:dur="2000"/>
     </mc:Choice>
-    <mc:Fallback>
+    <mc:Fallback xmlns="">
       <p:transition spd="slow"/>
     </mc:Fallback>
   </mc:AlternateContent>
@@ -14450,11 +14462,11 @@
   <p:clrMapOvr>
     <a:masterClrMapping/>
   </p:clrMapOvr>
-  <mc:AlternateContent xmlns:mc="http://schemas.openxmlformats.org/markup-compatibility/2006">
-    <mc:Choice xmlns:p14="http://schemas.microsoft.com/office/powerpoint/2010/main" Requires="p14">
+  <mc:AlternateContent xmlns:mc="http://schemas.openxmlformats.org/markup-compatibility/2006" xmlns:p14="http://schemas.microsoft.com/office/powerpoint/2010/main">
+    <mc:Choice Requires="p14">
       <p:transition spd="slow" p14:dur="2000"/>
     </mc:Choice>
-    <mc:Fallback>
+    <mc:Fallback xmlns="">
       <p:transition spd="slow"/>
     </mc:Fallback>
   </mc:AlternateContent>
@@ -14554,11 +14566,11 @@
   <p:clrMapOvr>
     <a:masterClrMapping/>
   </p:clrMapOvr>
-  <mc:AlternateContent xmlns:mc="http://schemas.openxmlformats.org/markup-compatibility/2006">
-    <mc:Choice xmlns:p14="http://schemas.microsoft.com/office/powerpoint/2010/main" Requires="p14">
+  <mc:AlternateContent xmlns:mc="http://schemas.openxmlformats.org/markup-compatibility/2006" xmlns:p14="http://schemas.microsoft.com/office/powerpoint/2010/main">
+    <mc:Choice Requires="p14">
       <p:transition spd="slow" p14:dur="2000"/>
     </mc:Choice>
-    <mc:Fallback>
+    <mc:Fallback xmlns="">
       <p:transition spd="slow"/>
     </mc:Fallback>
   </mc:AlternateContent>
@@ -14692,7 +14704,7 @@
             <a:pPr algn="ctr"/>
             <a:r>
               <a:rPr lang="en-US" dirty="0" smtClean="0"/>
-              <a:t>Run to Completion</a:t>
+              <a:t>Ran to Completion</a:t>
             </a:r>
             <a:endParaRPr lang="en-US" dirty="0"/>
           </a:p>
@@ -15004,6 +15016,120 @@
           </a:fontRef>
         </p:style>
       </p:cxnSp>
+      <p:sp>
+        <p:nvSpPr>
+          <p:cNvPr id="15" name="Oval 14"/>
+          <p:cNvSpPr/>
+          <p:nvPr/>
+        </p:nvSpPr>
+        <p:spPr>
+          <a:xfrm>
+            <a:off x="6984243" y="2339382"/>
+            <a:ext cx="1475911" cy="681167"/>
+          </a:xfrm>
+          <a:prstGeom prst="ellipse">
+            <a:avLst/>
+          </a:prstGeom>
+        </p:spPr>
+        <p:style>
+          <a:lnRef idx="1">
+            <a:schemeClr val="accent1"/>
+          </a:lnRef>
+          <a:fillRef idx="3">
+            <a:schemeClr val="accent1"/>
+          </a:fillRef>
+          <a:effectRef idx="2">
+            <a:schemeClr val="accent1"/>
+          </a:effectRef>
+          <a:fontRef idx="minor">
+            <a:schemeClr val="lt1"/>
+          </a:fontRef>
+        </p:style>
+        <p:txBody>
+          <a:bodyPr lIns="91436" tIns="45718" rIns="91436" bIns="45718" rtlCol="0" anchor="ctr"/>
+          <a:lstStyle/>
+          <a:p>
+            <a:pPr algn="ctr"/>
+            <a:r>
+              <a:rPr lang="en-US" sz="1400" dirty="0" smtClean="0"/>
+              <a:t>Waiting for Children to Complete</a:t>
+            </a:r>
+            <a:endParaRPr lang="en-US" sz="1400" dirty="0"/>
+          </a:p>
+        </p:txBody>
+      </p:sp>
+      <p:cxnSp>
+        <p:nvCxnSpPr>
+          <p:cNvPr id="17" name="Straight Arrow Connector 16"/>
+          <p:cNvCxnSpPr>
+            <a:stCxn id="12" idx="6"/>
+            <a:endCxn id="15" idx="2"/>
+          </p:cNvCxnSpPr>
+          <p:nvPr/>
+        </p:nvCxnSpPr>
+        <p:spPr>
+          <a:xfrm flipV="1">
+            <a:off x="5479447" y="2679966"/>
+            <a:ext cx="1504796" cy="8143"/>
+          </a:xfrm>
+          <a:prstGeom prst="straightConnector1">
+            <a:avLst/>
+          </a:prstGeom>
+          <a:ln>
+            <a:tailEnd type="triangle"/>
+          </a:ln>
+        </p:spPr>
+        <p:style>
+          <a:lnRef idx="2">
+            <a:schemeClr val="dk1"/>
+          </a:lnRef>
+          <a:fillRef idx="0">
+            <a:schemeClr val="dk1"/>
+          </a:fillRef>
+          <a:effectRef idx="1">
+            <a:schemeClr val="dk1"/>
+          </a:effectRef>
+          <a:fontRef idx="minor">
+            <a:schemeClr val="tx1"/>
+          </a:fontRef>
+        </p:style>
+      </p:cxnSp>
+      <p:cxnSp>
+        <p:nvCxnSpPr>
+          <p:cNvPr id="19" name="Straight Arrow Connector 18"/>
+          <p:cNvCxnSpPr>
+            <a:stCxn id="15" idx="0"/>
+            <a:endCxn id="12" idx="0"/>
+          </p:cNvCxnSpPr>
+          <p:nvPr/>
+        </p:nvCxnSpPr>
+        <p:spPr>
+          <a:xfrm flipH="1" flipV="1">
+            <a:off x="4571999" y="2233998"/>
+            <a:ext cx="3150200" cy="105384"/>
+          </a:xfrm>
+          <a:prstGeom prst="straightConnector1">
+            <a:avLst/>
+          </a:prstGeom>
+          <a:ln>
+            <a:tailEnd type="triangle"/>
+          </a:ln>
+        </p:spPr>
+        <p:style>
+          <a:lnRef idx="2">
+            <a:schemeClr val="dk1"/>
+          </a:lnRef>
+          <a:fillRef idx="0">
+            <a:schemeClr val="dk1"/>
+          </a:fillRef>
+          <a:effectRef idx="1">
+            <a:schemeClr val="dk1"/>
+          </a:effectRef>
+          <a:fontRef idx="minor">
+            <a:schemeClr val="tx1"/>
+          </a:fontRef>
+        </p:style>
+      </p:cxnSp>
     </p:spTree>
     <p:extLst>
       <p:ext uri="{BB962C8B-B14F-4D97-AF65-F5344CB8AC3E}">
@@ -15014,11 +15140,11 @@
   <p:clrMapOvr>
     <a:masterClrMapping/>
   </p:clrMapOvr>
-  <mc:AlternateContent xmlns:mc="http://schemas.openxmlformats.org/markup-compatibility/2006">
-    <mc:Choice xmlns:p14="http://schemas.microsoft.com/office/powerpoint/2010/main" Requires="p14">
+  <mc:AlternateContent xmlns:mc="http://schemas.openxmlformats.org/markup-compatibility/2006" xmlns:p14="http://schemas.microsoft.com/office/powerpoint/2010/main">
+    <mc:Choice Requires="p14">
       <p:transition spd="slow" p14:dur="2000"/>
     </mc:Choice>
-    <mc:Fallback>
+    <mc:Fallback xmlns="">
       <p:transition spd="slow"/>
     </mc:Fallback>
   </mc:AlternateContent>
@@ -15137,11 +15263,11 @@
   <p:clrMapOvr>
     <a:masterClrMapping/>
   </p:clrMapOvr>
-  <mc:AlternateContent xmlns:mc="http://schemas.openxmlformats.org/markup-compatibility/2006">
-    <mc:Choice xmlns:p14="http://schemas.microsoft.com/office/powerpoint/2010/main" Requires="p14">
+  <mc:AlternateContent xmlns:mc="http://schemas.openxmlformats.org/markup-compatibility/2006" xmlns:p14="http://schemas.microsoft.com/office/powerpoint/2010/main">
+    <mc:Choice Requires="p14">
       <p:transition spd="slow" p14:dur="2000"/>
     </mc:Choice>
-    <mc:Fallback>
+    <mc:Fallback xmlns="">
       <p:transition spd="slow"/>
     </mc:Fallback>
   </mc:AlternateContent>
@@ -15234,11 +15360,11 @@
   <p:clrMapOvr>
     <a:masterClrMapping/>
   </p:clrMapOvr>
-  <mc:AlternateContent xmlns:mc="http://schemas.openxmlformats.org/markup-compatibility/2006">
-    <mc:Choice xmlns:p14="http://schemas.microsoft.com/office/powerpoint/2010/main" Requires="p14">
+  <mc:AlternateContent xmlns:mc="http://schemas.openxmlformats.org/markup-compatibility/2006" xmlns:p14="http://schemas.microsoft.com/office/powerpoint/2010/main">
+    <mc:Choice Requires="p14">
       <p:transition spd="slow" p14:dur="2000"/>
     </mc:Choice>
-    <mc:Fallback>
+    <mc:Fallback xmlns="">
       <p:transition spd="slow"/>
     </mc:Fallback>
   </mc:AlternateContent>
@@ -15396,11 +15522,11 @@
   <p:clrMapOvr>
     <a:masterClrMapping/>
   </p:clrMapOvr>
-  <mc:AlternateContent xmlns:mc="http://schemas.openxmlformats.org/markup-compatibility/2006">
-    <mc:Choice xmlns:p14="http://schemas.microsoft.com/office/powerpoint/2010/main" Requires="p14">
+  <mc:AlternateContent xmlns:mc="http://schemas.openxmlformats.org/markup-compatibility/2006" xmlns:p14="http://schemas.microsoft.com/office/powerpoint/2010/main">
+    <mc:Choice Requires="p14">
       <p:transition spd="slow" p14:dur="2000"/>
     </mc:Choice>
-    <mc:Fallback>
+    <mc:Fallback xmlns="">
       <p:transition spd="slow"/>
     </mc:Fallback>
   </mc:AlternateContent>
@@ -15861,11 +15987,11 @@
   <p:clrMapOvr>
     <a:masterClrMapping/>
   </p:clrMapOvr>
-  <mc:AlternateContent xmlns:mc="http://schemas.openxmlformats.org/markup-compatibility/2006">
-    <mc:Choice xmlns:p14="http://schemas.microsoft.com/office/powerpoint/2010/main" Requires="p14">
+  <mc:AlternateContent xmlns:mc="http://schemas.openxmlformats.org/markup-compatibility/2006" xmlns:p14="http://schemas.microsoft.com/office/powerpoint/2010/main">
+    <mc:Choice Requires="p14">
       <p:transition spd="slow" p14:dur="2000"/>
     </mc:Choice>
-    <mc:Fallback>
+    <mc:Fallback xmlns="">
       <p:transition spd="slow"/>
     </mc:Fallback>
   </mc:AlternateContent>
@@ -15965,11 +16091,11 @@
   <p:clrMapOvr>
     <a:masterClrMapping/>
   </p:clrMapOvr>
-  <mc:AlternateContent xmlns:mc="http://schemas.openxmlformats.org/markup-compatibility/2006">
-    <mc:Choice xmlns:p14="http://schemas.microsoft.com/office/powerpoint/2010/main" Requires="p14">
+  <mc:AlternateContent xmlns:mc="http://schemas.openxmlformats.org/markup-compatibility/2006" xmlns:p14="http://schemas.microsoft.com/office/powerpoint/2010/main">
+    <mc:Choice Requires="p14">
       <p:transition spd="slow" p14:dur="2000"/>
     </mc:Choice>
-    <mc:Fallback>
+    <mc:Fallback xmlns="">
       <p:transition spd="slow"/>
     </mc:Fallback>
   </mc:AlternateContent>
@@ -16086,11 +16212,11 @@
   <p:clrMapOvr>
     <a:masterClrMapping/>
   </p:clrMapOvr>
-  <mc:AlternateContent xmlns:mc="http://schemas.openxmlformats.org/markup-compatibility/2006">
-    <mc:Choice xmlns:p14="http://schemas.microsoft.com/office/powerpoint/2010/main" Requires="p14">
+  <mc:AlternateContent xmlns:mc="http://schemas.openxmlformats.org/markup-compatibility/2006" xmlns:p14="http://schemas.microsoft.com/office/powerpoint/2010/main">
+    <mc:Choice Requires="p14">
       <p:transition spd="slow" p14:dur="2000"/>
     </mc:Choice>
-    <mc:Fallback>
+    <mc:Fallback xmlns="">
       <p:transition spd="slow"/>
     </mc:Fallback>
   </mc:AlternateContent>
@@ -16811,11 +16937,11 @@
   <p:clrMapOvr>
     <a:masterClrMapping/>
   </p:clrMapOvr>
-  <mc:AlternateContent xmlns:mc="http://schemas.openxmlformats.org/markup-compatibility/2006">
-    <mc:Choice xmlns:p14="http://schemas.microsoft.com/office/powerpoint/2010/main" Requires="p14">
+  <mc:AlternateContent xmlns:mc="http://schemas.openxmlformats.org/markup-compatibility/2006" xmlns:p14="http://schemas.microsoft.com/office/powerpoint/2010/main">
+    <mc:Choice Requires="p14">
       <p:transition spd="slow" p14:dur="2000"/>
     </mc:Choice>
-    <mc:Fallback>
+    <mc:Fallback xmlns="">
       <p:transition spd="slow"/>
     </mc:Fallback>
   </mc:AlternateContent>
@@ -16943,11 +17069,11 @@
   <p:clrMapOvr>
     <a:masterClrMapping/>
   </p:clrMapOvr>
-  <mc:AlternateContent xmlns:mc="http://schemas.openxmlformats.org/markup-compatibility/2006">
-    <mc:Choice xmlns:p14="http://schemas.microsoft.com/office/powerpoint/2010/main" Requires="p14">
+  <mc:AlternateContent xmlns:mc="http://schemas.openxmlformats.org/markup-compatibility/2006" xmlns:p14="http://schemas.microsoft.com/office/powerpoint/2010/main">
+    <mc:Choice Requires="p14">
       <p:transition spd="slow" p14:dur="2000"/>
     </mc:Choice>
-    <mc:Fallback>
+    <mc:Fallback xmlns="">
       <p:transition spd="slow"/>
     </mc:Fallback>
   </mc:AlternateContent>
@@ -16996,8 +17122,28 @@
           <a:lstStyle/>
           <a:p>
             <a:r>
+              <a:rPr lang="en-US" dirty="0"/>
+              <a:t>Dynamic Task </a:t>
+            </a:r>
+            <a:r>
               <a:rPr lang="en-US" dirty="0" smtClean="0"/>
-              <a:t>Lame Joke</a:t>
+              <a:t>Parallelism</a:t>
+            </a:r>
+            <a:r>
+              <a:rPr lang="en-US" dirty="0"/>
+              <a:t> </a:t>
+            </a:r>
+            <a:r>
+              <a:rPr lang="en-US" dirty="0" smtClean="0"/>
+              <a:t>(</a:t>
+            </a:r>
+            <a:r>
+              <a:rPr lang="en-US" dirty="0"/>
+              <a:t>Recursive Decomposition</a:t>
+            </a:r>
+            <a:r>
+              <a:rPr lang="en-US" dirty="0" smtClean="0"/>
+              <a:t>)</a:t>
             </a:r>
             <a:endParaRPr lang="en-US" dirty="0"/>
           </a:p>
@@ -17018,20 +17164,44 @@
           <a:bodyPr/>
           <a:lstStyle/>
           <a:p>
-            <a:pPr marL="0" indent="0">
-              <a:buNone/>
-            </a:pPr>
-            <a:r>
-              <a:rPr lang="en-US" b="1" dirty="0"/>
-              <a:t>Audience Participation</a:t>
+            <a:r>
+              <a:rPr lang="en-US" dirty="0"/>
+              <a:t>Tasks are dynamically added to the work queue as computation proceeds.</a:t>
+            </a:r>
+          </a:p>
+          <a:p>
+            <a:r>
+              <a:rPr lang="en-US" dirty="0"/>
+              <a:t>Applies to problems that are solved by first solving smaller, related problems.</a:t>
+            </a:r>
+          </a:p>
+          <a:p>
+            <a:r>
+              <a:rPr lang="en-US" dirty="0"/>
+              <a:t>Examples</a:t>
+            </a:r>
+          </a:p>
+          <a:p>
+            <a:pPr lvl="1"/>
+            <a:r>
+              <a:rPr lang="en-US" dirty="0"/>
+              <a:t>Works for traversing trees and graphs (Partitioned by child node)</a:t>
+            </a:r>
+          </a:p>
+          <a:p>
+            <a:pPr lvl="1"/>
+            <a:r>
+              <a:rPr lang="en-US" dirty="0"/>
+              <a:t>Geographic or geometric aspects (Partitioned </a:t>
             </a:r>
             <a:r>
               <a:rPr lang="en-US"/>
-              <a:t>:  Paul DeCarlo</a:t>
-            </a:r>
-            <a:endParaRPr lang="en-US" dirty="0"/>
-          </a:p>
-          <a:p>
+              <a:t>spatially</a:t>
+            </a:r>
+            <a:r>
+              <a:rPr lang="en-US" smtClean="0"/>
+              <a:t>)</a:t>
+            </a:r>
             <a:endParaRPr lang="en-US" dirty="0"/>
           </a:p>
         </p:txBody>
@@ -17039,18 +17209,18 @@
     </p:spTree>
     <p:extLst>
       <p:ext uri="{BB962C8B-B14F-4D97-AF65-F5344CB8AC3E}">
-        <p14:creationId xmlns:p14="http://schemas.microsoft.com/office/powerpoint/2010/main" val="3112344474"/>
+        <p14:creationId xmlns:p14="http://schemas.microsoft.com/office/powerpoint/2010/main" val="703390104"/>
       </p:ext>
     </p:extLst>
   </p:cSld>
   <p:clrMapOvr>
     <a:masterClrMapping/>
   </p:clrMapOvr>
-  <mc:AlternateContent xmlns:mc="http://schemas.openxmlformats.org/markup-compatibility/2006">
-    <mc:Choice xmlns:p14="http://schemas.microsoft.com/office/powerpoint/2010/main" Requires="p14">
+  <mc:AlternateContent xmlns:mc="http://schemas.openxmlformats.org/markup-compatibility/2006" xmlns:p14="http://schemas.microsoft.com/office/powerpoint/2010/main">
+    <mc:Choice Requires="p14">
       <p:transition spd="slow" p14:dur="2000"/>
     </mc:Choice>
-    <mc:Fallback>
+    <mc:Fallback xmlns="">
       <p:transition spd="slow"/>
     </mc:Fallback>
   </mc:AlternateContent>
@@ -17100,7 +17270,7 @@
           <a:p>
             <a:r>
               <a:rPr lang="en-US" dirty="0" smtClean="0"/>
-              <a:t>Pipelines</a:t>
+              <a:t>Lame Joke</a:t>
             </a:r>
             <a:endParaRPr lang="en-US" dirty="0"/>
           </a:p>
@@ -17121,28 +17291,20 @@
           <a:bodyPr/>
           <a:lstStyle/>
           <a:p>
-            <a:r>
-              <a:rPr lang="en-US" dirty="0" smtClean="0"/>
-              <a:t>Uses parallel tasks and concurrent queues to process a sequence of input values.</a:t>
-            </a:r>
-          </a:p>
-          <a:p>
-            <a:r>
-              <a:rPr lang="en-US" dirty="0" smtClean="0"/>
-              <a:t>Each task implements a stage of the pipeline.</a:t>
-            </a:r>
-          </a:p>
-          <a:p>
-            <a:r>
-              <a:rPr lang="en-US" dirty="0" smtClean="0"/>
-              <a:t>Queues act as buffers that allow the stages to execute concurrently, even though the inputs are processed in order.</a:t>
-            </a:r>
-          </a:p>
-          <a:p>
-            <a:r>
-              <a:rPr lang="en-US" dirty="0" smtClean="0"/>
-              <a:t>Analogous to an assembly line.</a:t>
-            </a:r>
+            <a:pPr marL="0" indent="0">
+              <a:buNone/>
+            </a:pPr>
+            <a:r>
+              <a:rPr lang="en-US" b="1" dirty="0"/>
+              <a:t>Audience Participation</a:t>
+            </a:r>
+            <a:r>
+              <a:rPr lang="en-US"/>
+              <a:t>:  Paul DeCarlo</a:t>
+            </a:r>
+            <a:endParaRPr lang="en-US" dirty="0"/>
+          </a:p>
+          <a:p>
             <a:endParaRPr lang="en-US" dirty="0"/>
           </a:p>
         </p:txBody>
@@ -17150,18 +17312,18 @@
     </p:spTree>
     <p:extLst>
       <p:ext uri="{BB962C8B-B14F-4D97-AF65-F5344CB8AC3E}">
-        <p14:creationId xmlns:p14="http://schemas.microsoft.com/office/powerpoint/2010/main" val="1707760923"/>
+        <p14:creationId xmlns:p14="http://schemas.microsoft.com/office/powerpoint/2010/main" val="3112344474"/>
       </p:ext>
     </p:extLst>
   </p:cSld>
   <p:clrMapOvr>
     <a:masterClrMapping/>
   </p:clrMapOvr>
-  <mc:AlternateContent xmlns:mc="http://schemas.openxmlformats.org/markup-compatibility/2006">
-    <mc:Choice xmlns:p14="http://schemas.microsoft.com/office/powerpoint/2010/main" Requires="p14">
+  <mc:AlternateContent xmlns:mc="http://schemas.openxmlformats.org/markup-compatibility/2006" xmlns:p14="http://schemas.microsoft.com/office/powerpoint/2010/main">
+    <mc:Choice Requires="p14">
       <p:transition spd="slow" p14:dur="2000"/>
     </mc:Choice>
-    <mc:Fallback>
+    <mc:Fallback xmlns="">
       <p:transition spd="slow"/>
     </mc:Fallback>
   </mc:AlternateContent>
@@ -17176,6 +17338,117 @@
 </file>
 
 <file path=ppt/slides/slide32.xml><?xml version="1.0" encoding="utf-8"?>
+<p:sld xmlns:a="http://schemas.openxmlformats.org/drawingml/2006/main" xmlns:r="http://schemas.openxmlformats.org/officeDocument/2006/relationships" xmlns:p="http://schemas.openxmlformats.org/presentationml/2006/main">
+  <p:cSld>
+    <p:spTree>
+      <p:nvGrpSpPr>
+        <p:cNvPr id="1" name=""/>
+        <p:cNvGrpSpPr/>
+        <p:nvPr/>
+      </p:nvGrpSpPr>
+      <p:grpSpPr>
+        <a:xfrm>
+          <a:off x="0" y="0"/>
+          <a:ext cx="0" cy="0"/>
+          <a:chOff x="0" y="0"/>
+          <a:chExt cx="0" cy="0"/>
+        </a:xfrm>
+      </p:grpSpPr>
+      <p:sp>
+        <p:nvSpPr>
+          <p:cNvPr id="2" name="Title 1"/>
+          <p:cNvSpPr>
+            <a:spLocks noGrp="1"/>
+          </p:cNvSpPr>
+          <p:nvPr>
+            <p:ph type="title"/>
+          </p:nvPr>
+        </p:nvSpPr>
+        <p:spPr/>
+        <p:txBody>
+          <a:bodyPr>
+            <a:normAutofit fontScale="90000"/>
+          </a:bodyPr>
+          <a:lstStyle/>
+          <a:p>
+            <a:r>
+              <a:rPr lang="en-US" dirty="0" smtClean="0"/>
+              <a:t>Pipelines</a:t>
+            </a:r>
+            <a:endParaRPr lang="en-US" dirty="0"/>
+          </a:p>
+        </p:txBody>
+      </p:sp>
+      <p:sp>
+        <p:nvSpPr>
+          <p:cNvPr id="3" name="Content Placeholder 2"/>
+          <p:cNvSpPr>
+            <a:spLocks noGrp="1"/>
+          </p:cNvSpPr>
+          <p:nvPr>
+            <p:ph idx="1"/>
+          </p:nvPr>
+        </p:nvSpPr>
+        <p:spPr/>
+        <p:txBody>
+          <a:bodyPr/>
+          <a:lstStyle/>
+          <a:p>
+            <a:r>
+              <a:rPr lang="en-US" dirty="0" smtClean="0"/>
+              <a:t>Uses parallel tasks and concurrent queues to process a sequence of input values.</a:t>
+            </a:r>
+          </a:p>
+          <a:p>
+            <a:r>
+              <a:rPr lang="en-US" dirty="0" smtClean="0"/>
+              <a:t>Each task implements a stage of the pipeline.</a:t>
+            </a:r>
+          </a:p>
+          <a:p>
+            <a:r>
+              <a:rPr lang="en-US" dirty="0" smtClean="0"/>
+              <a:t>Queues act as buffers that allow the stages to execute concurrently, even though the inputs are processed in order.</a:t>
+            </a:r>
+          </a:p>
+          <a:p>
+            <a:r>
+              <a:rPr lang="en-US" dirty="0" smtClean="0"/>
+              <a:t>Analogous to an assembly line.</a:t>
+            </a:r>
+            <a:endParaRPr lang="en-US" dirty="0"/>
+          </a:p>
+        </p:txBody>
+      </p:sp>
+    </p:spTree>
+    <p:extLst>
+      <p:ext uri="{BB962C8B-B14F-4D97-AF65-F5344CB8AC3E}">
+        <p14:creationId xmlns:p14="http://schemas.microsoft.com/office/powerpoint/2010/main" val="1707760923"/>
+      </p:ext>
+    </p:extLst>
+  </p:cSld>
+  <p:clrMapOvr>
+    <a:masterClrMapping/>
+  </p:clrMapOvr>
+  <mc:AlternateContent xmlns:mc="http://schemas.openxmlformats.org/markup-compatibility/2006" xmlns:p14="http://schemas.microsoft.com/office/powerpoint/2010/main">
+    <mc:Choice Requires="p14">
+      <p:transition spd="slow" p14:dur="2000"/>
+    </mc:Choice>
+    <mc:Fallback xmlns="">
+      <p:transition spd="slow"/>
+    </mc:Fallback>
+  </mc:AlternateContent>
+  <p:timing>
+    <p:tnLst>
+      <p:par>
+        <p:cTn id="1" dur="indefinite" restart="never" nodeType="tmRoot"/>
+      </p:par>
+    </p:tnLst>
+  </p:timing>
+</p:sld>
+</file>
+
+<file path=ppt/slides/slide33.xml><?xml version="1.0" encoding="utf-8"?>
 <p:sld xmlns:a="http://schemas.openxmlformats.org/drawingml/2006/main" xmlns:r="http://schemas.openxmlformats.org/officeDocument/2006/relationships" xmlns:p="http://schemas.openxmlformats.org/presentationml/2006/main">
   <p:cSld>
     <p:spTree>
@@ -17920,172 +18193,11 @@
   <p:clrMapOvr>
     <a:masterClrMapping/>
   </p:clrMapOvr>
-  <mc:AlternateContent xmlns:mc="http://schemas.openxmlformats.org/markup-compatibility/2006">
-    <mc:Choice xmlns:p14="http://schemas.microsoft.com/office/powerpoint/2010/main" Requires="p14">
+  <mc:AlternateContent xmlns:mc="http://schemas.openxmlformats.org/markup-compatibility/2006" xmlns:p14="http://schemas.microsoft.com/office/powerpoint/2010/main">
+    <mc:Choice Requires="p14">
       <p:transition spd="slow" p14:dur="2000"/>
     </mc:Choice>
-    <mc:Fallback>
-      <p:transition spd="slow"/>
-    </mc:Fallback>
-  </mc:AlternateContent>
-  <p:timing>
-    <p:tnLst>
-      <p:par>
-        <p:cTn id="1" dur="indefinite" restart="never" nodeType="tmRoot"/>
-      </p:par>
-    </p:tnLst>
-  </p:timing>
-</p:sld>
-</file>
-
-<file path=ppt/slides/slide33.xml><?xml version="1.0" encoding="utf-8"?>
-<p:sld xmlns:a="http://schemas.openxmlformats.org/drawingml/2006/main" xmlns:r="http://schemas.openxmlformats.org/officeDocument/2006/relationships" xmlns:p="http://schemas.openxmlformats.org/presentationml/2006/main">
-  <p:cSld>
-    <p:spTree>
-      <p:nvGrpSpPr>
-        <p:cNvPr id="1" name=""/>
-        <p:cNvGrpSpPr/>
-        <p:nvPr/>
-      </p:nvGrpSpPr>
-      <p:grpSpPr>
-        <a:xfrm>
-          <a:off x="0" y="0"/>
-          <a:ext cx="0" cy="0"/>
-          <a:chOff x="0" y="0"/>
-          <a:chExt cx="0" cy="0"/>
-        </a:xfrm>
-      </p:grpSpPr>
-      <p:sp>
-        <p:nvSpPr>
-          <p:cNvPr id="2" name="Title 1"/>
-          <p:cNvSpPr>
-            <a:spLocks noGrp="1"/>
-          </p:cNvSpPr>
-          <p:nvPr>
-            <p:ph type="title"/>
-          </p:nvPr>
-        </p:nvSpPr>
-        <p:spPr/>
-        <p:txBody>
-          <a:bodyPr>
-            <a:normAutofit fontScale="90000"/>
-          </a:bodyPr>
-          <a:lstStyle/>
-          <a:p>
-            <a:r>
-              <a:rPr lang="en-US" dirty="0" smtClean="0"/>
-              <a:t>Anti-Patterns</a:t>
-            </a:r>
-            <a:endParaRPr lang="en-US" dirty="0"/>
-          </a:p>
-        </p:txBody>
-      </p:sp>
-      <p:sp>
-        <p:nvSpPr>
-          <p:cNvPr id="3" name="Content Placeholder 2"/>
-          <p:cNvSpPr>
-            <a:spLocks noGrp="1"/>
-          </p:cNvSpPr>
-          <p:nvPr>
-            <p:ph idx="1"/>
-          </p:nvPr>
-        </p:nvSpPr>
-        <p:spPr/>
-        <p:txBody>
-          <a:bodyPr>
-            <a:normAutofit fontScale="85000" lnSpcReduction="20000"/>
-          </a:bodyPr>
-          <a:lstStyle/>
-          <a:p>
-            <a:r>
-              <a:rPr lang="en-US" b="1" dirty="0" smtClean="0"/>
-              <a:t>Thread starvation</a:t>
-            </a:r>
-            <a:r>
-              <a:rPr lang="en-US" dirty="0" smtClean="0"/>
-              <a:t>:  If there are not enough threads to run all pipeline tasks, the blocking collections can fill and block indefinitely.</a:t>
-            </a:r>
-          </a:p>
-          <a:p>
-            <a:r>
-              <a:rPr lang="en-US" b="1" dirty="0" smtClean="0"/>
-              <a:t>Infinite blocking collection waits</a:t>
-            </a:r>
-            <a:r>
-              <a:rPr lang="en-US" dirty="0" smtClean="0"/>
-              <a:t>:  If a pipeline task throws an exception, it will no longer take values from its input blocking collection.  If the input collection is full, the task that fills it will block.  Be sure to cancel pipelines if you anticipate this situation.</a:t>
-            </a:r>
-          </a:p>
-          <a:p>
-            <a:r>
-              <a:rPr lang="en-US" b="1" dirty="0" smtClean="0"/>
-              <a:t>Forgetting </a:t>
-            </a:r>
-            <a:r>
-              <a:rPr lang="en-US" b="1" dirty="0" err="1" smtClean="0"/>
-              <a:t>GetConsumingEnumerable</a:t>
-            </a:r>
-            <a:r>
-              <a:rPr lang="en-US" b="1" dirty="0" smtClean="0"/>
-              <a:t>()</a:t>
-            </a:r>
-            <a:r>
-              <a:rPr lang="en-US" dirty="0" smtClean="0"/>
-              <a:t>:  Blocking collections implement </a:t>
-            </a:r>
-            <a:r>
-              <a:rPr lang="en-US" dirty="0" err="1" smtClean="0"/>
-              <a:t>IEnumerable</a:t>
-            </a:r>
-            <a:r>
-              <a:rPr lang="en-US" dirty="0" smtClean="0"/>
-              <a:t>&lt;T&gt;, so this is easy to forget.  If you forget, the enumeration will be a snapshot and won’t consume from the collection.</a:t>
-            </a:r>
-          </a:p>
-          <a:p>
-            <a:r>
-              <a:rPr lang="en-US" b="1" dirty="0" smtClean="0"/>
-              <a:t>Using other flavors of </a:t>
-            </a:r>
-            <a:r>
-              <a:rPr lang="en-US" b="1" dirty="0" err="1" smtClean="0"/>
-              <a:t>IProducerConsumerCollection</a:t>
-            </a:r>
-            <a:r>
-              <a:rPr lang="en-US" b="1" dirty="0" smtClean="0"/>
-              <a:t> for your blocking collections</a:t>
-            </a:r>
-            <a:r>
-              <a:rPr lang="en-US" dirty="0" smtClean="0"/>
-              <a:t>:  </a:t>
-            </a:r>
-            <a:r>
-              <a:rPr lang="en-US" dirty="0" err="1" smtClean="0"/>
-              <a:t>ConcurrentStack</a:t>
-            </a:r>
-            <a:r>
-              <a:rPr lang="en-US" dirty="0" smtClean="0"/>
-              <a:t> may never consume the earliest entries, for examples.</a:t>
-            </a:r>
-            <a:endParaRPr lang="en-US" dirty="0"/>
-          </a:p>
-        </p:txBody>
-      </p:sp>
-    </p:spTree>
-    <p:extLst>
-      <p:ext uri="{BB962C8B-B14F-4D97-AF65-F5344CB8AC3E}">
-        <p14:creationId xmlns:p14="http://schemas.microsoft.com/office/powerpoint/2010/main" val="1549961303"/>
-      </p:ext>
-    </p:extLst>
-  </p:cSld>
-  <p:clrMapOvr>
-    <a:masterClrMapping/>
-  </p:clrMapOvr>
-  <mc:AlternateContent xmlns:mc="http://schemas.openxmlformats.org/markup-compatibility/2006">
-    <mc:Choice xmlns:p14="http://schemas.microsoft.com/office/powerpoint/2010/main" Requires="p14">
-      <p:transition spd="slow" p14:dur="2000"/>
-    </mc:Choice>
-    <mc:Fallback>
+    <mc:Fallback xmlns="">
       <p:transition spd="slow"/>
     </mc:Fallback>
   </mc:AlternateContent>
@@ -18135,7 +18247,7 @@
           <a:p>
             <a:r>
               <a:rPr lang="en-US" dirty="0" smtClean="0"/>
-              <a:t>Lame Joke</a:t>
+              <a:t>Anti-Patterns</a:t>
             </a:r>
             <a:endParaRPr lang="en-US" dirty="0"/>
           </a:p>
@@ -18153,16 +18265,80 @@
         </p:nvSpPr>
         <p:spPr/>
         <p:txBody>
-          <a:bodyPr/>
+          <a:bodyPr>
+            <a:normAutofit fontScale="85000" lnSpcReduction="20000"/>
+          </a:bodyPr>
           <a:lstStyle/>
           <a:p>
             <a:r>
-              <a:rPr lang="en-US" dirty="0"/>
-              <a:t>Audience Participation</a:t>
+              <a:rPr lang="en-US" b="1" dirty="0" smtClean="0"/>
+              <a:t>Thread starvation</a:t>
             </a:r>
             <a:r>
               <a:rPr lang="en-US" dirty="0" smtClean="0"/>
-              <a:t>!</a:t>
+              <a:t>:  If there are not enough threads to run all pipeline tasks, the blocking collections can fill and block indefinitely.</a:t>
+            </a:r>
+          </a:p>
+          <a:p>
+            <a:r>
+              <a:rPr lang="en-US" b="1" dirty="0" smtClean="0"/>
+              <a:t>Infinite blocking collection waits</a:t>
+            </a:r>
+            <a:r>
+              <a:rPr lang="en-US" dirty="0" smtClean="0"/>
+              <a:t>:  If a pipeline task throws an exception, it will no longer take values from its input blocking collection.  If the input collection is full, the task that fills it will block.  Be sure to cancel pipelines if you anticipate this situation.</a:t>
+            </a:r>
+          </a:p>
+          <a:p>
+            <a:r>
+              <a:rPr lang="en-US" b="1" dirty="0" smtClean="0"/>
+              <a:t>Forgetting </a:t>
+            </a:r>
+            <a:r>
+              <a:rPr lang="en-US" b="1" dirty="0" err="1" smtClean="0"/>
+              <a:t>GetConsumingEnumerable</a:t>
+            </a:r>
+            <a:r>
+              <a:rPr lang="en-US" b="1" dirty="0" smtClean="0"/>
+              <a:t>()</a:t>
+            </a:r>
+            <a:r>
+              <a:rPr lang="en-US" dirty="0" smtClean="0"/>
+              <a:t>:  Blocking collections implement </a:t>
+            </a:r>
+            <a:r>
+              <a:rPr lang="en-US" dirty="0" err="1" smtClean="0"/>
+              <a:t>IEnumerable</a:t>
+            </a:r>
+            <a:r>
+              <a:rPr lang="en-US" dirty="0" smtClean="0"/>
+              <a:t>&lt;T&gt;, so this is easy to forget.  If you forget, the enumeration will be a snapshot and won’t consume from the collection.</a:t>
+            </a:r>
+          </a:p>
+          <a:p>
+            <a:r>
+              <a:rPr lang="en-US" b="1" dirty="0" smtClean="0"/>
+              <a:t>Using other flavors of </a:t>
+            </a:r>
+            <a:r>
+              <a:rPr lang="en-US" b="1" dirty="0" err="1" smtClean="0"/>
+              <a:t>IProducerConsumerCollection</a:t>
+            </a:r>
+            <a:r>
+              <a:rPr lang="en-US" b="1" dirty="0" smtClean="0"/>
+              <a:t> for your blocking collections</a:t>
+            </a:r>
+            <a:r>
+              <a:rPr lang="en-US" dirty="0" smtClean="0"/>
+              <a:t>:  </a:t>
+            </a:r>
+            <a:r>
+              <a:rPr lang="en-US" dirty="0" err="1" smtClean="0"/>
+              <a:t>ConcurrentStack</a:t>
+            </a:r>
+            <a:r>
+              <a:rPr lang="en-US" dirty="0" smtClean="0"/>
+              <a:t> may never consume the earliest entries, for examples.</a:t>
             </a:r>
             <a:endParaRPr lang="en-US" dirty="0"/>
           </a:p>
@@ -18171,18 +18347,18 @@
     </p:spTree>
     <p:extLst>
       <p:ext uri="{BB962C8B-B14F-4D97-AF65-F5344CB8AC3E}">
-        <p14:creationId xmlns:p14="http://schemas.microsoft.com/office/powerpoint/2010/main" val="3112344474"/>
+        <p14:creationId xmlns:p14="http://schemas.microsoft.com/office/powerpoint/2010/main" val="1549961303"/>
       </p:ext>
     </p:extLst>
   </p:cSld>
   <p:clrMapOvr>
     <a:masterClrMapping/>
   </p:clrMapOvr>
-  <mc:AlternateContent xmlns:mc="http://schemas.openxmlformats.org/markup-compatibility/2006">
-    <mc:Choice xmlns:p14="http://schemas.microsoft.com/office/powerpoint/2010/main" Requires="p14">
+  <mc:AlternateContent xmlns:mc="http://schemas.openxmlformats.org/markup-compatibility/2006" xmlns:p14="http://schemas.microsoft.com/office/powerpoint/2010/main">
+    <mc:Choice Requires="p14">
       <p:transition spd="slow" p14:dur="2000"/>
     </mc:Choice>
-    <mc:Fallback>
+    <mc:Fallback xmlns="">
       <p:transition spd="slow"/>
     </mc:Fallback>
   </mc:AlternateContent>
@@ -18232,7 +18408,7 @@
           <a:p>
             <a:r>
               <a:rPr lang="en-US" dirty="0" smtClean="0"/>
-              <a:t>Other Examples</a:t>
+              <a:t>Lame Joke</a:t>
             </a:r>
             <a:endParaRPr lang="en-US" dirty="0"/>
           </a:p>
@@ -18254,43 +18430,32 @@
           <a:lstStyle/>
           <a:p>
             <a:r>
-              <a:rPr lang="en-US" dirty="0" err="1" smtClean="0"/>
-              <a:t>Async</a:t>
+              <a:rPr lang="en-US" dirty="0"/>
+              <a:t>Audience Participation</a:t>
             </a:r>
             <a:r>
               <a:rPr lang="en-US" dirty="0" smtClean="0"/>
-              <a:t> Controllers</a:t>
-            </a:r>
-          </a:p>
-          <a:p>
-            <a:r>
-              <a:rPr lang="en-US" dirty="0"/>
-              <a:t>Finding “Similar” Strings</a:t>
-            </a:r>
-          </a:p>
-          <a:p>
-            <a:r>
-              <a:rPr lang="en-US" dirty="0" smtClean="0"/>
-              <a:t>Parallel Quick Sort</a:t>
-            </a:r>
+              <a:t>!</a:t>
+            </a:r>
+            <a:endParaRPr lang="en-US" dirty="0"/>
           </a:p>
         </p:txBody>
       </p:sp>
     </p:spTree>
     <p:extLst>
       <p:ext uri="{BB962C8B-B14F-4D97-AF65-F5344CB8AC3E}">
-        <p14:creationId xmlns:p14="http://schemas.microsoft.com/office/powerpoint/2010/main" val="3347100784"/>
+        <p14:creationId xmlns:p14="http://schemas.microsoft.com/office/powerpoint/2010/main" val="3112344474"/>
       </p:ext>
     </p:extLst>
   </p:cSld>
   <p:clrMapOvr>
     <a:masterClrMapping/>
   </p:clrMapOvr>
-  <mc:AlternateContent xmlns:mc="http://schemas.openxmlformats.org/markup-compatibility/2006">
-    <mc:Choice xmlns:p14="http://schemas.microsoft.com/office/powerpoint/2010/main" Requires="p14">
+  <mc:AlternateContent xmlns:mc="http://schemas.openxmlformats.org/markup-compatibility/2006" xmlns:p14="http://schemas.microsoft.com/office/powerpoint/2010/main">
+    <mc:Choice Requires="p14">
       <p:transition spd="slow" p14:dur="2000"/>
     </mc:Choice>
-    <mc:Fallback>
+    <mc:Fallback xmlns="">
       <p:transition spd="slow"/>
     </mc:Fallback>
   </mc:AlternateContent>
@@ -18340,7 +18505,7 @@
           <a:p>
             <a:r>
               <a:rPr lang="en-US" dirty="0" smtClean="0"/>
-              <a:t>Questions And Answers</a:t>
+              <a:t>Other Examples</a:t>
             </a:r>
             <a:endParaRPr lang="en-US" dirty="0"/>
           </a:p>
@@ -18362,6 +18527,114 @@
           <a:lstStyle/>
           <a:p>
             <a:r>
+              <a:rPr lang="en-US" dirty="0" err="1" smtClean="0"/>
+              <a:t>Async</a:t>
+            </a:r>
+            <a:r>
+              <a:rPr lang="en-US" dirty="0" smtClean="0"/>
+              <a:t> Controllers</a:t>
+            </a:r>
+          </a:p>
+          <a:p>
+            <a:r>
+              <a:rPr lang="en-US" dirty="0"/>
+              <a:t>Finding “Similar” Strings</a:t>
+            </a:r>
+          </a:p>
+          <a:p>
+            <a:r>
+              <a:rPr lang="en-US" dirty="0" smtClean="0"/>
+              <a:t>Parallel Quick Sort</a:t>
+            </a:r>
+          </a:p>
+        </p:txBody>
+      </p:sp>
+    </p:spTree>
+    <p:extLst>
+      <p:ext uri="{BB962C8B-B14F-4D97-AF65-F5344CB8AC3E}">
+        <p14:creationId xmlns:p14="http://schemas.microsoft.com/office/powerpoint/2010/main" val="3347100784"/>
+      </p:ext>
+    </p:extLst>
+  </p:cSld>
+  <p:clrMapOvr>
+    <a:masterClrMapping/>
+  </p:clrMapOvr>
+  <mc:AlternateContent xmlns:mc="http://schemas.openxmlformats.org/markup-compatibility/2006" xmlns:p14="http://schemas.microsoft.com/office/powerpoint/2010/main">
+    <mc:Choice Requires="p14">
+      <p:transition spd="slow" p14:dur="2000"/>
+    </mc:Choice>
+    <mc:Fallback xmlns="">
+      <p:transition spd="slow"/>
+    </mc:Fallback>
+  </mc:AlternateContent>
+  <p:timing>
+    <p:tnLst>
+      <p:par>
+        <p:cTn id="1" dur="indefinite" restart="never" nodeType="tmRoot"/>
+      </p:par>
+    </p:tnLst>
+  </p:timing>
+</p:sld>
+</file>
+
+<file path=ppt/slides/slide37.xml><?xml version="1.0" encoding="utf-8"?>
+<p:sld xmlns:a="http://schemas.openxmlformats.org/drawingml/2006/main" xmlns:r="http://schemas.openxmlformats.org/officeDocument/2006/relationships" xmlns:p="http://schemas.openxmlformats.org/presentationml/2006/main">
+  <p:cSld>
+    <p:spTree>
+      <p:nvGrpSpPr>
+        <p:cNvPr id="1" name=""/>
+        <p:cNvGrpSpPr/>
+        <p:nvPr/>
+      </p:nvGrpSpPr>
+      <p:grpSpPr>
+        <a:xfrm>
+          <a:off x="0" y="0"/>
+          <a:ext cx="0" cy="0"/>
+          <a:chOff x="0" y="0"/>
+          <a:chExt cx="0" cy="0"/>
+        </a:xfrm>
+      </p:grpSpPr>
+      <p:sp>
+        <p:nvSpPr>
+          <p:cNvPr id="2" name="Title 1"/>
+          <p:cNvSpPr>
+            <a:spLocks noGrp="1"/>
+          </p:cNvSpPr>
+          <p:nvPr>
+            <p:ph type="title"/>
+          </p:nvPr>
+        </p:nvSpPr>
+        <p:spPr/>
+        <p:txBody>
+          <a:bodyPr>
+            <a:normAutofit fontScale="90000"/>
+          </a:bodyPr>
+          <a:lstStyle/>
+          <a:p>
+            <a:r>
+              <a:rPr lang="en-US" dirty="0" smtClean="0"/>
+              <a:t>Questions And Answers</a:t>
+            </a:r>
+            <a:endParaRPr lang="en-US" dirty="0"/>
+          </a:p>
+        </p:txBody>
+      </p:sp>
+      <p:sp>
+        <p:nvSpPr>
+          <p:cNvPr id="3" name="Content Placeholder 2"/>
+          <p:cNvSpPr>
+            <a:spLocks noGrp="1"/>
+          </p:cNvSpPr>
+          <p:nvPr>
+            <p:ph idx="1"/>
+          </p:nvPr>
+        </p:nvSpPr>
+        <p:spPr/>
+        <p:txBody>
+          <a:bodyPr/>
+          <a:lstStyle/>
+          <a:p>
+            <a:r>
               <a:rPr lang="en-US" dirty="0" smtClean="0"/>
               <a:t>You line ‘</a:t>
             </a:r>
@@ -18410,11 +18683,11 @@
   <p:clrMapOvr>
     <a:masterClrMapping/>
   </p:clrMapOvr>
-  <mc:AlternateContent xmlns:mc="http://schemas.openxmlformats.org/markup-compatibility/2006">
-    <mc:Choice xmlns:p14="http://schemas.microsoft.com/office/powerpoint/2010/main" Requires="p14">
+  <mc:AlternateContent xmlns:mc="http://schemas.openxmlformats.org/markup-compatibility/2006" xmlns:p14="http://schemas.microsoft.com/office/powerpoint/2010/main">
+    <mc:Choice Requires="p14">
       <p:transition spd="slow" p14:dur="2000"/>
     </mc:Choice>
-    <mc:Fallback>
+    <mc:Fallback xmlns="">
       <p:transition spd="slow"/>
     </mc:Fallback>
   </mc:AlternateContent>
@@ -18550,11 +18823,11 @@
   <p:clrMapOvr>
     <a:masterClrMapping/>
   </p:clrMapOvr>
-  <mc:AlternateContent xmlns:mc="http://schemas.openxmlformats.org/markup-compatibility/2006">
-    <mc:Choice xmlns:p14="http://schemas.microsoft.com/office/powerpoint/2010/main" Requires="p14">
+  <mc:AlternateContent xmlns:mc="http://schemas.openxmlformats.org/markup-compatibility/2006" xmlns:p14="http://schemas.microsoft.com/office/powerpoint/2010/main">
+    <mc:Choice Requires="p14">
       <p:transition spd="slow" p14:dur="2000"/>
     </mc:Choice>
-    <mc:Fallback>
+    <mc:Fallback xmlns="">
       <p:transition spd="slow"/>
     </mc:Fallback>
   </mc:AlternateContent>
@@ -18646,11 +18919,11 @@
   <p:clrMapOvr>
     <a:masterClrMapping/>
   </p:clrMapOvr>
-  <mc:AlternateContent xmlns:mc="http://schemas.openxmlformats.org/markup-compatibility/2006">
-    <mc:Choice xmlns:p14="http://schemas.microsoft.com/office/powerpoint/2010/main" Requires="p14">
+  <mc:AlternateContent xmlns:mc="http://schemas.openxmlformats.org/markup-compatibility/2006" xmlns:p14="http://schemas.microsoft.com/office/powerpoint/2010/main">
+    <mc:Choice Requires="p14">
       <p:transition spd="slow" p14:dur="2000"/>
     </mc:Choice>
-    <mc:Fallback>
+    <mc:Fallback xmlns="">
       <p:transition spd="slow"/>
     </mc:Fallback>
   </mc:AlternateContent>
@@ -18752,11 +19025,11 @@
   <p:clrMapOvr>
     <a:masterClrMapping/>
   </p:clrMapOvr>
-  <mc:AlternateContent xmlns:mc="http://schemas.openxmlformats.org/markup-compatibility/2006">
-    <mc:Choice xmlns:p14="http://schemas.microsoft.com/office/powerpoint/2010/main" Requires="p14">
+  <mc:AlternateContent xmlns:mc="http://schemas.openxmlformats.org/markup-compatibility/2006" xmlns:p14="http://schemas.microsoft.com/office/powerpoint/2010/main">
+    <mc:Choice Requires="p14">
       <p:transition spd="slow" p14:dur="2000"/>
     </mc:Choice>
-    <mc:Fallback>
+    <mc:Fallback xmlns="">
       <p:transition spd="slow"/>
     </mc:Fallback>
   </mc:AlternateContent>
@@ -18848,11 +19121,11 @@
   <p:clrMapOvr>
     <a:masterClrMapping/>
   </p:clrMapOvr>
-  <mc:AlternateContent xmlns:mc="http://schemas.openxmlformats.org/markup-compatibility/2006">
-    <mc:Choice xmlns:p14="http://schemas.microsoft.com/office/powerpoint/2010/main" Requires="p14">
+  <mc:AlternateContent xmlns:mc="http://schemas.openxmlformats.org/markup-compatibility/2006" xmlns:p14="http://schemas.microsoft.com/office/powerpoint/2010/main">
+    <mc:Choice Requires="p14">
       <p:transition spd="slow" p14:dur="2000"/>
     </mc:Choice>
-    <mc:Fallback>
+    <mc:Fallback xmlns="">
       <p:transition spd="slow"/>
     </mc:Fallback>
   </mc:AlternateContent>
@@ -19043,11 +19316,11 @@
   <p:clrMapOvr>
     <a:masterClrMapping/>
   </p:clrMapOvr>
-  <mc:AlternateContent xmlns:mc="http://schemas.openxmlformats.org/markup-compatibility/2006">
-    <mc:Choice xmlns:p14="http://schemas.microsoft.com/office/powerpoint/2010/main" Requires="p14">
+  <mc:AlternateContent xmlns:mc="http://schemas.openxmlformats.org/markup-compatibility/2006" xmlns:p14="http://schemas.microsoft.com/office/powerpoint/2010/main">
+    <mc:Choice Requires="p14">
       <p:transition spd="slow" p14:dur="2000"/>
     </mc:Choice>
-    <mc:Fallback>
+    <mc:Fallback xmlns="">
       <p:transition spd="slow"/>
     </mc:Fallback>
   </mc:AlternateContent>
@@ -19145,11 +19418,11 @@
   <p:clrMapOvr>
     <a:masterClrMapping/>
   </p:clrMapOvr>
-  <mc:AlternateContent xmlns:mc="http://schemas.openxmlformats.org/markup-compatibility/2006">
-    <mc:Choice xmlns:p14="http://schemas.microsoft.com/office/powerpoint/2010/main" Requires="p14">
+  <mc:AlternateContent xmlns:mc="http://schemas.openxmlformats.org/markup-compatibility/2006" xmlns:p14="http://schemas.microsoft.com/office/powerpoint/2010/main">
+    <mc:Choice Requires="p14">
       <p:transition spd="slow" p14:dur="2000"/>
     </mc:Choice>
-    <mc:Fallback>
+    <mc:Fallback xmlns="">
       <p:transition spd="slow"/>
     </mc:Fallback>
   </mc:AlternateContent>
@@ -19482,13 +19755,28 @@
   <a:extraClrSchemeLst/>
   <a:extLst>
     <a:ext uri="{05A4C25C-085E-4340-85A3-A5531E510DB2}">
-      <thm15:themeFamily xmlns="" xmlns:thm15="http://schemas.microsoft.com/office/thememl/2012/main" name="2013 Improving ppt template [Read-Only]" id="{9CD52372-1ABB-429C-AE8B-5116A847D281}" vid="{C9E045ED-5E7D-45F0-ABC2-8913C89F506A}"/>
+      <thm15:themeFamily xmlns:thm15="http://schemas.microsoft.com/office/thememl/2012/main" xmlns="" name="2013 Improving ppt template [Read-Only]" id="{9CD52372-1ABB-429C-AE8B-5116A847D281}" vid="{C9E045ED-5E7D-45F0-ABC2-8913C89F506A}"/>
     </a:ext>
   </a:extLst>
 </a:theme>
 </file>
 
 <file path=customXml/item1.xml><?xml version="1.0" encoding="utf-8"?>
+<p:properties xmlns:p="http://schemas.microsoft.com/office/2006/metadata/properties" xmlns:xsi="http://www.w3.org/2001/XMLSchema-instance" xmlns:pc="http://schemas.microsoft.com/office/infopath/2007/PartnerControls">
+  <documentManagement/>
+</p:properties>
+</file>
+
+<file path=customXml/item2.xml><?xml version="1.0" encoding="utf-8"?>
+<?mso-contentType ?>
+<FormTemplates xmlns="http://schemas.microsoft.com/sharepoint/v3/contenttype/forms">
+  <Display>DocumentLibraryForm</Display>
+  <Edit>DocumentLibraryForm</Edit>
+  <New>DocumentLibraryForm</New>
+</FormTemplates>
+</file>
+
+<file path=customXml/item3.xml><?xml version="1.0" encoding="utf-8"?>
 <ct:contentTypeSchema xmlns:ct="http://schemas.microsoft.com/office/2006/metadata/contentType" xmlns:ma="http://schemas.microsoft.com/office/2006/metadata/properties/metaAttributes" ct:_="" ma:_="" ma:contentTypeName="Document" ma:contentTypeID="0x010100D7398AE121397446B28901E5E849BF40" ma:contentTypeVersion="1" ma:contentTypeDescription="Create a new document." ma:contentTypeScope="" ma:versionID="a7e693a555462a2cb5a0a6921c4c327e">
   <xsd:schema xmlns:xsd="http://www.w3.org/2001/XMLSchema" xmlns:xs="http://www.w3.org/2001/XMLSchema" xmlns:p="http://schemas.microsoft.com/office/2006/metadata/properties" targetNamespace="http://schemas.microsoft.com/office/2006/metadata/properties" ma:root="true" ma:fieldsID="391dd5b7355e85894d95fdf891f88749">
     <xsd:element name="properties">
@@ -19602,22 +19890,30 @@
 </ct:contentTypeSchema>
 </file>
 
-<file path=customXml/item2.xml><?xml version="1.0" encoding="utf-8"?>
-<?mso-contentType ?>
-<FormTemplates xmlns="http://schemas.microsoft.com/sharepoint/v3/contenttype/forms">
-  <Display>DocumentLibraryForm</Display>
-  <Edit>DocumentLibraryForm</Edit>
-  <New>DocumentLibraryForm</New>
-</FormTemplates>
+<file path=customXml/itemProps1.xml><?xml version="1.0" encoding="utf-8"?>
+<ds:datastoreItem xmlns:ds="http://schemas.openxmlformats.org/officeDocument/2006/customXml" ds:itemID="{A04551C0-1604-41A0-9B5C-A5F88AD2E0FE}">
+  <ds:schemaRefs>
+    <ds:schemaRef ds:uri="http://purl.org/dc/elements/1.1/"/>
+    <ds:schemaRef ds:uri="http://schemas.microsoft.com/office/infopath/2007/PartnerControls"/>
+    <ds:schemaRef ds:uri="http://purl.org/dc/dcmitype/"/>
+    <ds:schemaRef ds:uri="http://purl.org/dc/terms/"/>
+    <ds:schemaRef ds:uri="http://schemas.microsoft.com/office/2006/metadata/properties"/>
+    <ds:schemaRef ds:uri="http://schemas.openxmlformats.org/package/2006/metadata/core-properties"/>
+    <ds:schemaRef ds:uri="http://schemas.microsoft.com/office/2006/documentManagement/types"/>
+    <ds:schemaRef ds:uri="http://www.w3.org/XML/1998/namespace"/>
+  </ds:schemaRefs>
+</ds:datastoreItem>
 </file>
 
-<file path=customXml/item3.xml><?xml version="1.0" encoding="utf-8"?>
-<p:properties xmlns:p="http://schemas.microsoft.com/office/2006/metadata/properties" xmlns:xsi="http://www.w3.org/2001/XMLSchema-instance" xmlns:pc="http://schemas.microsoft.com/office/infopath/2007/PartnerControls">
-  <documentManagement/>
-</p:properties>
+<file path=customXml/itemProps2.xml><?xml version="1.0" encoding="utf-8"?>
+<ds:datastoreItem xmlns:ds="http://schemas.openxmlformats.org/officeDocument/2006/customXml" ds:itemID="{B857AB07-B2ED-439E-860F-4F56FB345D1B}">
+  <ds:schemaRefs>
+    <ds:schemaRef ds:uri="http://schemas.microsoft.com/sharepoint/v3/contenttype/forms"/>
+  </ds:schemaRefs>
+</ds:datastoreItem>
 </file>
 
-<file path=customXml/itemProps1.xml><?xml version="1.0" encoding="utf-8"?>
+<file path=customXml/itemProps3.xml><?xml version="1.0" encoding="utf-8"?>
 <ds:datastoreItem xmlns:ds="http://schemas.openxmlformats.org/officeDocument/2006/customXml" ds:itemID="{BC072F6F-04ED-4B85-B28F-4D6DE375C2E0}">
   <ds:schemaRefs>
     <ds:schemaRef ds:uri="http://schemas.microsoft.com/office/2006/metadata/contentType"/>
@@ -19631,27 +19927,4 @@
     <ds:schemaRef ds:uri="http://schemas.microsoft.com/office/infopath/2007/PartnerControls"/>
   </ds:schemaRefs>
 </ds:datastoreItem>
-</file>
-
-<file path=customXml/itemProps2.xml><?xml version="1.0" encoding="utf-8"?>
-<ds:datastoreItem xmlns:ds="http://schemas.openxmlformats.org/officeDocument/2006/customXml" ds:itemID="{B857AB07-B2ED-439E-860F-4F56FB345D1B}">
-  <ds:schemaRefs>
-    <ds:schemaRef ds:uri="http://schemas.microsoft.com/sharepoint/v3/contenttype/forms"/>
-  </ds:schemaRefs>
-</ds:datastoreItem>
-</file>
-
-<file path=customXml/itemProps3.xml><?xml version="1.0" encoding="utf-8"?>
-<ds:datastoreItem xmlns:ds="http://schemas.openxmlformats.org/officeDocument/2006/customXml" ds:itemID="{A04551C0-1604-41A0-9B5C-A5F88AD2E0FE}">
-  <ds:schemaRefs>
-    <ds:schemaRef ds:uri="http://purl.org/dc/elements/1.1/"/>
-    <ds:schemaRef ds:uri="http://schemas.microsoft.com/office/infopath/2007/PartnerControls"/>
-    <ds:schemaRef ds:uri="http://purl.org/dc/dcmitype/"/>
-    <ds:schemaRef ds:uri="http://purl.org/dc/terms/"/>
-    <ds:schemaRef ds:uri="http://schemas.microsoft.com/office/2006/metadata/properties"/>
-    <ds:schemaRef ds:uri="http://schemas.openxmlformats.org/package/2006/metadata/core-properties"/>
-    <ds:schemaRef ds:uri="http://schemas.microsoft.com/office/2006/documentManagement/types"/>
-    <ds:schemaRef ds:uri="http://www.w3.org/XML/1998/namespace"/>
-  </ds:schemaRefs>
-</ds:datastoreItem>
 </file>
</xml_diff>